<commit_message>
Update MOD03 and MOD04
</commit_message>
<xml_diff>
--- a/MOD03-Algorithms/01 Presentacion/MOD3-Algoritmos_y_Diagramas.pptx
+++ b/MOD03-Algorithms/01 Presentacion/MOD3-Algoritmos_y_Diagramas.pptx
@@ -387,7 +387,7 @@
             <a:fld id="{A8CFC892-7674-4263-9B21-5444F469832B}" type="datetimeFigureOut">
               <a:rPr lang="en-US" smtClean="0"/>
               <a:pPr/>
-              <a:t>9/4/23</a:t>
+              <a:t>9/4/2023</a:t>
             </a:fld>
             <a:endParaRPr lang="en-US"/>
           </a:p>
@@ -954,7 +954,7 @@
           <a:p>
             <a:fld id="{A8CFC892-7674-4263-9B21-5444F469832B}" type="datetimeFigureOut">
               <a:rPr lang="en-US" smtClean="0"/>
-              <a:t>9/4/23</a:t>
+              <a:t>9/4/2023</a:t>
             </a:fld>
             <a:endParaRPr lang="en-US"/>
           </a:p>
@@ -1421,7 +1421,7 @@
             <a:fld id="{A8CFC892-7674-4263-9B21-5444F469832B}" type="datetimeFigureOut">
               <a:rPr lang="en-US" smtClean="0"/>
               <a:pPr/>
-              <a:t>9/4/23</a:t>
+              <a:t>9/4/2023</a:t>
             </a:fld>
             <a:endParaRPr lang="en-US"/>
           </a:p>
@@ -2028,8 +2028,16 @@
           <a:lstStyle/>
           <a:p>
             <a:r>
+              <a:rPr lang="es-MX" dirty="0" err="1"/>
+              <a:t>Algorithm</a:t>
+            </a:r>
+            <a:r>
               <a:rPr lang="es-MX" dirty="0"/>
-              <a:t>Diseño de algoritmos</a:t>
+              <a:t> </a:t>
+            </a:r>
+            <a:r>
+              <a:rPr lang="es-MX" dirty="0" err="1"/>
+              <a:t>Design</a:t>
             </a:r>
             <a:endParaRPr lang="en-US" dirty="0"/>
           </a:p>
@@ -2067,8 +2075,108 @@
               <a:buNone/>
             </a:pPr>
             <a:r>
+              <a:rPr lang="es-MX" sz="3600" dirty="0" err="1"/>
+              <a:t>The</a:t>
+            </a:r>
+            <a:r>
               <a:rPr lang="es-MX" sz="3600" dirty="0"/>
-              <a:t>La computadora no debe entender el algoritmo, mientras pueda ejecutarlo. </a:t>
+              <a:t> </a:t>
+            </a:r>
+            <a:r>
+              <a:rPr lang="es-MX" sz="3600" dirty="0" err="1"/>
+              <a:t>computer</a:t>
+            </a:r>
+            <a:r>
+              <a:rPr lang="es-MX" sz="3600" dirty="0"/>
+              <a:t> </a:t>
+            </a:r>
+            <a:r>
+              <a:rPr lang="es-MX" sz="3600" dirty="0" err="1"/>
+              <a:t>does</a:t>
+            </a:r>
+            <a:r>
+              <a:rPr lang="es-MX" sz="3600" dirty="0"/>
+              <a:t> </a:t>
+            </a:r>
+            <a:r>
+              <a:rPr lang="es-MX" sz="3600" dirty="0" err="1"/>
+              <a:t>not</a:t>
+            </a:r>
+            <a:r>
+              <a:rPr lang="es-MX" sz="3600" dirty="0"/>
+              <a:t> </a:t>
+            </a:r>
+            <a:r>
+              <a:rPr lang="es-MX" sz="3600" dirty="0" err="1"/>
+              <a:t>need</a:t>
+            </a:r>
+            <a:r>
+              <a:rPr lang="es-MX" sz="3600" dirty="0"/>
+              <a:t> </a:t>
+            </a:r>
+            <a:r>
+              <a:rPr lang="es-MX" sz="3600" dirty="0" err="1"/>
+              <a:t>to</a:t>
+            </a:r>
+            <a:r>
+              <a:rPr lang="es-MX" sz="3600" dirty="0"/>
+              <a:t> </a:t>
+            </a:r>
+            <a:r>
+              <a:rPr lang="es-MX" sz="3600" dirty="0" err="1"/>
+              <a:t>understand</a:t>
+            </a:r>
+            <a:r>
+              <a:rPr lang="es-MX" sz="3600" dirty="0"/>
+              <a:t> </a:t>
+            </a:r>
+            <a:r>
+              <a:rPr lang="es-MX" sz="3600" dirty="0" err="1"/>
+              <a:t>an</a:t>
+            </a:r>
+            <a:r>
+              <a:rPr lang="es-MX" sz="3600" dirty="0"/>
+              <a:t> </a:t>
+            </a:r>
+            <a:r>
+              <a:rPr lang="es-MX" sz="3600" dirty="0" err="1"/>
+              <a:t>algorithm</a:t>
+            </a:r>
+            <a:r>
+              <a:rPr lang="es-MX" sz="3600" dirty="0"/>
+              <a:t>, as </a:t>
+            </a:r>
+            <a:r>
+              <a:rPr lang="es-MX" sz="3600" dirty="0" err="1"/>
+              <a:t>long</a:t>
+            </a:r>
+            <a:r>
+              <a:rPr lang="es-MX" sz="3600" dirty="0"/>
+              <a:t> as </a:t>
+            </a:r>
+            <a:r>
+              <a:rPr lang="es-MX" sz="3600" dirty="0" err="1"/>
+              <a:t>it</a:t>
+            </a:r>
+            <a:r>
+              <a:rPr lang="es-MX" sz="3600" dirty="0"/>
+              <a:t> can </a:t>
+            </a:r>
+            <a:r>
+              <a:rPr lang="es-MX" sz="3600" dirty="0" err="1"/>
+              <a:t>execute</a:t>
+            </a:r>
+            <a:r>
+              <a:rPr lang="es-MX" sz="3600" dirty="0"/>
+              <a:t> </a:t>
+            </a:r>
+            <a:r>
+              <a:rPr lang="es-MX" sz="3600" dirty="0" err="1"/>
+              <a:t>it</a:t>
+            </a:r>
+            <a:r>
+              <a:rPr lang="es-MX" sz="3600" dirty="0"/>
+              <a:t>.</a:t>
             </a:r>
           </a:p>
           <a:p>
@@ -2083,15 +2191,23 @@
             </a:pPr>
             <a:r>
               <a:rPr lang="es-MX" sz="3600" dirty="0"/>
-              <a:t>Un buen </a:t>
-            </a:r>
-            <a:r>
-              <a:rPr lang="es-MX" sz="3600" b="1" dirty="0">
+              <a:t>A </a:t>
+            </a:r>
+            <a:r>
+              <a:rPr lang="es-MX" sz="3600" dirty="0" err="1"/>
+              <a:t>good</a:t>
+            </a:r>
+            <a:r>
+              <a:rPr lang="es-MX" sz="3600" dirty="0"/>
+              <a:t> </a:t>
+            </a:r>
+            <a:r>
+              <a:rPr lang="es-MX" sz="3600" b="1" dirty="0" err="1">
                 <a:solidFill>
                   <a:schemeClr val="accent1"/>
                 </a:solidFill>
               </a:rPr>
-              <a:t>programador</a:t>
+              <a:t>programmer</a:t>
             </a:r>
             <a:r>
               <a:rPr lang="es-MX" sz="3600" dirty="0">
@@ -2103,9 +2219,72 @@
             </a:r>
             <a:r>
               <a:rPr lang="es-MX" sz="3600" dirty="0"/>
-              <a:t>debe dominar todos los aspectos y detalles del algoritmo para poderlo programar.</a:t>
-            </a:r>
-            <a:endParaRPr lang="en-US" sz="3600" dirty="0"/>
+              <a:t>has </a:t>
+            </a:r>
+            <a:r>
+              <a:rPr lang="es-MX" sz="3600" dirty="0" err="1"/>
+              <a:t>to</a:t>
+            </a:r>
+            <a:r>
+              <a:rPr lang="es-MX" sz="3600" dirty="0"/>
+              <a:t> </a:t>
+            </a:r>
+            <a:r>
+              <a:rPr lang="es-MX" sz="3600" dirty="0" err="1"/>
+              <a:t>understand</a:t>
+            </a:r>
+            <a:r>
+              <a:rPr lang="es-MX" sz="3600" dirty="0"/>
+              <a:t> </a:t>
+            </a:r>
+            <a:r>
+              <a:rPr lang="es-MX" sz="3600" dirty="0" err="1"/>
+              <a:t>all</a:t>
+            </a:r>
+            <a:r>
+              <a:rPr lang="es-MX" sz="3600" dirty="0"/>
+              <a:t> </a:t>
+            </a:r>
+            <a:r>
+              <a:rPr lang="es-MX" sz="3600" dirty="0" err="1"/>
+              <a:t>aspects</a:t>
+            </a:r>
+            <a:r>
+              <a:rPr lang="es-MX" sz="3600" dirty="0"/>
+              <a:t> and </a:t>
+            </a:r>
+            <a:r>
+              <a:rPr lang="es-MX" sz="3600" dirty="0" err="1"/>
+              <a:t>details</a:t>
+            </a:r>
+            <a:r>
+              <a:rPr lang="es-MX" sz="3600" dirty="0"/>
+              <a:t> </a:t>
+            </a:r>
+            <a:r>
+              <a:rPr lang="es-MX" sz="3600" dirty="0" err="1"/>
+              <a:t>of</a:t>
+            </a:r>
+            <a:r>
+              <a:rPr lang="es-MX" sz="3600" dirty="0"/>
+              <a:t> </a:t>
+            </a:r>
+            <a:r>
+              <a:rPr lang="es-MX" sz="3600" dirty="0" err="1"/>
+              <a:t>the</a:t>
+            </a:r>
+            <a:r>
+              <a:rPr lang="es-MX" sz="3600" dirty="0"/>
+              <a:t> </a:t>
+            </a:r>
+            <a:r>
+              <a:rPr lang="es-MX" sz="3600" dirty="0" err="1"/>
+              <a:t>algorithm</a:t>
+            </a:r>
+            <a:r>
+              <a:rPr lang="es-MX" sz="3600" dirty="0"/>
+              <a:t>.</a:t>
+            </a:r>
           </a:p>
           <a:p>
             <a:pPr marL="0" indent="0">
@@ -2118,8 +2297,60 @@
               <a:buNone/>
             </a:pPr>
             <a:r>
+              <a:rPr lang="es-MX" sz="3600" dirty="0" err="1"/>
+              <a:t>The</a:t>
+            </a:r>
+            <a:r>
               <a:rPr lang="es-MX" sz="3600" dirty="0"/>
-              <a:t>El trabajo de un programador es </a:t>
+              <a:t> </a:t>
+            </a:r>
+            <a:r>
+              <a:rPr lang="es-MX" sz="3600" dirty="0" err="1"/>
+              <a:t>job</a:t>
+            </a:r>
+            <a:r>
+              <a:rPr lang="es-MX" sz="3600" dirty="0"/>
+              <a:t> </a:t>
+            </a:r>
+            <a:r>
+              <a:rPr lang="es-MX" sz="3600" dirty="0" err="1"/>
+              <a:t>of</a:t>
+            </a:r>
+            <a:r>
+              <a:rPr lang="es-MX" sz="3600" dirty="0"/>
+              <a:t> a </a:t>
+            </a:r>
+            <a:r>
+              <a:rPr lang="es-MX" sz="3600" dirty="0" err="1"/>
+              <a:t>programmer</a:t>
+            </a:r>
+            <a:r>
+              <a:rPr lang="es-MX" sz="3600" dirty="0"/>
+              <a:t> </a:t>
+            </a:r>
+            <a:r>
+              <a:rPr lang="es-MX" sz="3600" dirty="0" err="1"/>
+              <a:t>is</a:t>
+            </a:r>
+            <a:r>
+              <a:rPr lang="es-MX" sz="3600" dirty="0"/>
+              <a:t> </a:t>
+            </a:r>
+            <a:r>
+              <a:rPr lang="es-MX" sz="3600" dirty="0" err="1"/>
+              <a:t>to</a:t>
+            </a:r>
+            <a:r>
+              <a:rPr lang="es-MX" sz="3600" dirty="0"/>
+              <a:t> </a:t>
+            </a:r>
+            <a:r>
+              <a:rPr lang="es-MX" sz="3600" b="1" dirty="0" err="1">
+                <a:solidFill>
+                  <a:schemeClr val="accent1"/>
+                </a:solidFill>
+              </a:rPr>
+              <a:t>translate</a:t>
             </a:r>
             <a:r>
               <a:rPr lang="es-MX" sz="3600" b="1" dirty="0">
@@ -2127,7 +2358,103 @@
                   <a:schemeClr val="accent1"/>
                 </a:solidFill>
               </a:rPr>
-              <a:t>convertir las instrucciones de un algoritmo en código.</a:t>
+              <a:t> </a:t>
+            </a:r>
+            <a:r>
+              <a:rPr lang="es-MX" sz="3600" b="1" dirty="0" err="1">
+                <a:solidFill>
+                  <a:schemeClr val="accent1"/>
+                </a:solidFill>
+              </a:rPr>
+              <a:t>algorithm</a:t>
+            </a:r>
+            <a:r>
+              <a:rPr lang="es-MX" sz="3600" b="1" dirty="0">
+                <a:solidFill>
+                  <a:schemeClr val="accent1"/>
+                </a:solidFill>
+              </a:rPr>
+              <a:t> </a:t>
+            </a:r>
+            <a:r>
+              <a:rPr lang="es-MX" sz="3600" b="1" dirty="0" err="1">
+                <a:solidFill>
+                  <a:schemeClr val="accent1"/>
+                </a:solidFill>
+              </a:rPr>
+              <a:t>instructions</a:t>
+            </a:r>
+            <a:r>
+              <a:rPr lang="es-MX" sz="3600" b="1" dirty="0">
+                <a:solidFill>
+                  <a:schemeClr val="accent1"/>
+                </a:solidFill>
+              </a:rPr>
+              <a:t> </a:t>
+            </a:r>
+            <a:r>
+              <a:rPr lang="es-MX" sz="3600" b="1" dirty="0" err="1">
+                <a:solidFill>
+                  <a:schemeClr val="accent1"/>
+                </a:solidFill>
+              </a:rPr>
+              <a:t>into</a:t>
+            </a:r>
+            <a:r>
+              <a:rPr lang="es-MX" sz="3600" b="1" dirty="0">
+                <a:solidFill>
+                  <a:schemeClr val="accent1"/>
+                </a:solidFill>
+              </a:rPr>
+              <a:t> </a:t>
+            </a:r>
+            <a:r>
+              <a:rPr lang="es-MX" sz="3600" b="1" dirty="0" err="1">
+                <a:solidFill>
+                  <a:schemeClr val="accent1"/>
+                </a:solidFill>
+              </a:rPr>
+              <a:t>lines</a:t>
+            </a:r>
+            <a:r>
+              <a:rPr lang="es-MX" sz="3600" b="1" dirty="0">
+                <a:solidFill>
+                  <a:schemeClr val="accent1"/>
+                </a:solidFill>
+              </a:rPr>
+              <a:t> </a:t>
+            </a:r>
+            <a:r>
+              <a:rPr lang="es-MX" sz="3600" b="1" dirty="0" err="1">
+                <a:solidFill>
+                  <a:schemeClr val="accent1"/>
+                </a:solidFill>
+              </a:rPr>
+              <a:t>of</a:t>
+            </a:r>
+            <a:r>
+              <a:rPr lang="es-MX" sz="3600" b="1" dirty="0">
+                <a:solidFill>
+                  <a:schemeClr val="accent1"/>
+                </a:solidFill>
+              </a:rPr>
+              <a:t> </a:t>
+            </a:r>
+            <a:r>
+              <a:rPr lang="es-MX" sz="3600" b="1" dirty="0" err="1">
+                <a:solidFill>
+                  <a:schemeClr val="accent1"/>
+                </a:solidFill>
+              </a:rPr>
+              <a:t>code</a:t>
+            </a:r>
+            <a:r>
+              <a:rPr lang="es-MX" sz="3600" b="1" dirty="0">
+                <a:solidFill>
+                  <a:schemeClr val="accent1"/>
+                </a:solidFill>
+              </a:rPr>
+              <a:t>.</a:t>
             </a:r>
             <a:endParaRPr lang="es-MX" sz="3600" b="1" dirty="0"/>
           </a:p>
@@ -2432,10 +2759,42 @@
           <a:p>
             <a:pPr algn="ctr"/>
             <a:r>
-              <a:rPr lang="es-MX" sz="5400" i="1" dirty="0"/>
-              <a:t>Diseñar un algoritmo es trabajo altamente creativo</a:t>
-            </a:r>
-            <a:endParaRPr lang="en-US" sz="5400" i="1" dirty="0"/>
+              <a:rPr lang="es-MX" sz="5400" dirty="0" err="1"/>
+              <a:t>Designing</a:t>
+            </a:r>
+            <a:r>
+              <a:rPr lang="es-MX" sz="5400" dirty="0"/>
+              <a:t> </a:t>
+            </a:r>
+            <a:r>
+              <a:rPr lang="es-MX" sz="5400" dirty="0" err="1"/>
+              <a:t>algorithms</a:t>
+            </a:r>
+            <a:r>
+              <a:rPr lang="es-MX" sz="5400" dirty="0"/>
+              <a:t> </a:t>
+            </a:r>
+            <a:r>
+              <a:rPr lang="es-MX" sz="5400" dirty="0" err="1"/>
+              <a:t>is</a:t>
+            </a:r>
+            <a:r>
+              <a:rPr lang="es-MX" sz="5400" dirty="0"/>
+              <a:t> </a:t>
+            </a:r>
+            <a:r>
+              <a:rPr lang="es-MX" sz="5400" dirty="0" err="1"/>
+              <a:t>highly</a:t>
+            </a:r>
+            <a:r>
+              <a:rPr lang="es-MX" sz="5400" dirty="0"/>
+              <a:t> creative </a:t>
+            </a:r>
+            <a:r>
+              <a:rPr lang="es-MX" sz="5400" dirty="0" err="1"/>
+              <a:t>work</a:t>
+            </a:r>
+            <a:endParaRPr lang="en-US" sz="5400" dirty="0"/>
           </a:p>
         </p:txBody>
       </p:sp>
@@ -2493,68 +2852,6 @@
           </a:p>
         </p:txBody>
       </p:sp>
-      <p:sp>
-        <p:nvSpPr>
-          <p:cNvPr id="6" name="Title 1">
-            <a:extLst>
-              <a:ext uri="{FF2B5EF4-FFF2-40B4-BE49-F238E27FC236}">
-                <a16:creationId xmlns:a16="http://schemas.microsoft.com/office/drawing/2014/main" id="{59C04B33-709A-4588-A750-17794F1A21F9}"/>
-              </a:ext>
-            </a:extLst>
-          </p:cNvPr>
-          <p:cNvSpPr txBox="1">
-            <a:spLocks/>
-          </p:cNvSpPr>
-          <p:nvPr/>
-        </p:nvSpPr>
-        <p:spPr>
-          <a:xfrm>
-            <a:off x="5834741" y="4078737"/>
-            <a:ext cx="6302829" cy="2779263"/>
-          </a:xfrm>
-          <a:prstGeom prst="rect">
-            <a:avLst/>
-          </a:prstGeom>
-        </p:spPr>
-        <p:txBody>
-          <a:bodyPr/>
-          <a:lstStyle>
-            <a:lvl1pPr algn="l" defTabSz="914400" rtl="0" eaLnBrk="1" latinLnBrk="0" hangingPunct="1">
-              <a:lnSpc>
-                <a:spcPct val="90000"/>
-              </a:lnSpc>
-              <a:spcBef>
-                <a:spcPct val="0"/>
-              </a:spcBef>
-              <a:buNone/>
-              <a:defRPr sz="4400" b="1" kern="1200">
-                <a:solidFill>
-                  <a:schemeClr val="accent2"/>
-                </a:solidFill>
-                <a:latin typeface="Ubuntu" panose="020B0504030602030204" pitchFamily="34" charset="0"/>
-                <a:ea typeface="+mj-ea"/>
-                <a:cs typeface="Arial" panose="020B0604020202020204" pitchFamily="34" charset="0"/>
-              </a:defRPr>
-            </a:lvl1pPr>
-          </a:lstStyle>
-          <a:p>
-            <a:pPr algn="ctr"/>
-            <a:r>
-              <a:rPr lang="es-MX" sz="4800" i="1" dirty="0">
-                <a:solidFill>
-                  <a:schemeClr val="accent1"/>
-                </a:solidFill>
-              </a:rPr>
-              <a:t>¡Es detallar algo complicado de una forma lógica y sencilla!</a:t>
-            </a:r>
-            <a:endParaRPr lang="en-US" sz="4800" i="1" dirty="0">
-              <a:solidFill>
-                <a:schemeClr val="accent1"/>
-              </a:solidFill>
-            </a:endParaRPr>
-          </a:p>
-        </p:txBody>
-      </p:sp>
     </p:spTree>
     <p:extLst>
       <p:ext uri="{BB962C8B-B14F-4D97-AF65-F5344CB8AC3E}">
@@ -2565,130 +2862,6 @@
   <p:clrMapOvr>
     <a:masterClrMapping/>
   </p:clrMapOvr>
-  <p:timing>
-    <p:tnLst>
-      <p:par>
-        <p:cTn id="1" dur="indefinite" restart="never" nodeType="tmRoot">
-          <p:childTnLst>
-            <p:seq concurrent="1" nextAc="seek">
-              <p:cTn id="2" dur="indefinite" nodeType="mainSeq">
-                <p:childTnLst>
-                  <p:par>
-                    <p:cTn id="3" fill="hold">
-                      <p:stCondLst>
-                        <p:cond delay="indefinite"/>
-                      </p:stCondLst>
-                      <p:childTnLst>
-                        <p:par>
-                          <p:cTn id="4" fill="hold">
-                            <p:stCondLst>
-                              <p:cond delay="0"/>
-                            </p:stCondLst>
-                            <p:childTnLst>
-                              <p:par>
-                                <p:cTn id="5" presetID="2" presetClass="entr" presetSubtype="4" fill="hold" grpId="0" nodeType="clickEffect">
-                                  <p:stCondLst>
-                                    <p:cond delay="0"/>
-                                  </p:stCondLst>
-                                  <p:childTnLst>
-                                    <p:set>
-                                      <p:cBhvr>
-                                        <p:cTn id="6" dur="1" fill="hold">
-                                          <p:stCondLst>
-                                            <p:cond delay="0"/>
-                                          </p:stCondLst>
-                                        </p:cTn>
-                                        <p:tgtEl>
-                                          <p:spTgt spid="6"/>
-                                        </p:tgtEl>
-                                        <p:attrNameLst>
-                                          <p:attrName>style.visibility</p:attrName>
-                                        </p:attrNameLst>
-                                      </p:cBhvr>
-                                      <p:to>
-                                        <p:strVal val="visible"/>
-                                      </p:to>
-                                    </p:set>
-                                    <p:anim calcmode="lin" valueType="num">
-                                      <p:cBhvr additive="base">
-                                        <p:cTn id="7" dur="500" fill="hold"/>
-                                        <p:tgtEl>
-                                          <p:spTgt spid="6"/>
-                                        </p:tgtEl>
-                                        <p:attrNameLst>
-                                          <p:attrName>ppt_x</p:attrName>
-                                        </p:attrNameLst>
-                                      </p:cBhvr>
-                                      <p:tavLst>
-                                        <p:tav tm="0">
-                                          <p:val>
-                                            <p:strVal val="#ppt_x"/>
-                                          </p:val>
-                                        </p:tav>
-                                        <p:tav tm="100000">
-                                          <p:val>
-                                            <p:strVal val="#ppt_x"/>
-                                          </p:val>
-                                        </p:tav>
-                                      </p:tavLst>
-                                    </p:anim>
-                                    <p:anim calcmode="lin" valueType="num">
-                                      <p:cBhvr additive="base">
-                                        <p:cTn id="8" dur="500" fill="hold"/>
-                                        <p:tgtEl>
-                                          <p:spTgt spid="6"/>
-                                        </p:tgtEl>
-                                        <p:attrNameLst>
-                                          <p:attrName>ppt_y</p:attrName>
-                                        </p:attrNameLst>
-                                      </p:cBhvr>
-                                      <p:tavLst>
-                                        <p:tav tm="0">
-                                          <p:val>
-                                            <p:strVal val="1+#ppt_h/2"/>
-                                          </p:val>
-                                        </p:tav>
-                                        <p:tav tm="100000">
-                                          <p:val>
-                                            <p:strVal val="#ppt_y"/>
-                                          </p:val>
-                                        </p:tav>
-                                      </p:tavLst>
-                                    </p:anim>
-                                  </p:childTnLst>
-                                </p:cTn>
-                              </p:par>
-                            </p:childTnLst>
-                          </p:cTn>
-                        </p:par>
-                      </p:childTnLst>
-                    </p:cTn>
-                  </p:par>
-                </p:childTnLst>
-              </p:cTn>
-              <p:prevCondLst>
-                <p:cond evt="onPrev" delay="0">
-                  <p:tgtEl>
-                    <p:sldTgt/>
-                  </p:tgtEl>
-                </p:cond>
-              </p:prevCondLst>
-              <p:nextCondLst>
-                <p:cond evt="onNext" delay="0">
-                  <p:tgtEl>
-                    <p:sldTgt/>
-                  </p:tgtEl>
-                </p:cond>
-              </p:nextCondLst>
-            </p:seq>
-          </p:childTnLst>
-        </p:cTn>
-      </p:par>
-    </p:tnLst>
-    <p:bldLst>
-      <p:bldP spid="6" grpId="0"/>
-    </p:bldLst>
-  </p:timing>
 </p:sld>
 </file>
 
@@ -2902,62 +3075,386 @@
           </a:lstStyle>
           <a:p>
             <a:r>
+              <a:rPr lang="es-MX" sz="3000" dirty="0" err="1"/>
+              <a:t>How</a:t>
+            </a:r>
+            <a:r>
               <a:rPr lang="es-MX" sz="3000" dirty="0"/>
-              <a:t>¿Cuánta harina? </a:t>
-            </a:r>
-          </a:p>
-          <a:p>
+              <a:t> </a:t>
+            </a:r>
+            <a:r>
+              <a:rPr lang="es-MX" sz="3000" dirty="0" err="1"/>
+              <a:t>much</a:t>
+            </a:r>
             <a:r>
               <a:rPr lang="es-MX" sz="3000" dirty="0"/>
-              <a:t>¿Cuántos huevos? </a:t>
-            </a:r>
-          </a:p>
-          <a:p>
+              <a:t> </a:t>
+            </a:r>
+            <a:r>
+              <a:rPr lang="es-MX" sz="3000" dirty="0" err="1"/>
+              <a:t>flour</a:t>
+            </a:r>
             <a:r>
               <a:rPr lang="es-MX" sz="3000" dirty="0"/>
-              <a:t>¿Cuánta leche?</a:t>
-            </a:r>
-          </a:p>
-          <a:p>
+              <a:t>?</a:t>
+            </a:r>
+          </a:p>
+          <a:p>
+            <a:r>
+              <a:rPr lang="es-MX" sz="3000" dirty="0" err="1"/>
+              <a:t>How</a:t>
+            </a:r>
             <a:r>
               <a:rPr lang="es-MX" sz="3000" dirty="0"/>
-              <a:t>¿En qué recipiente?</a:t>
-            </a:r>
-          </a:p>
-          <a:p>
+              <a:t> </a:t>
+            </a:r>
+            <a:r>
+              <a:rPr lang="es-MX" sz="3000" dirty="0" err="1"/>
+              <a:t>many</a:t>
+            </a:r>
             <a:r>
               <a:rPr lang="es-MX" sz="3000" dirty="0"/>
-              <a:t>¿Cuánto tiempo hay que batir la mezcla? ¿Cómo? ¿En qué sentido?</a:t>
-            </a:r>
-          </a:p>
-          <a:p>
+              <a:t> </a:t>
+            </a:r>
+            <a:r>
+              <a:rPr lang="es-MX" sz="3000" dirty="0" err="1"/>
+              <a:t>eggs</a:t>
+            </a:r>
             <a:r>
               <a:rPr lang="es-MX" sz="3000" dirty="0"/>
-              <a:t>¿Cómo prendo el sartén?</a:t>
-            </a:r>
-          </a:p>
-          <a:p>
+              <a:t>?</a:t>
+            </a:r>
+          </a:p>
+          <a:p>
+            <a:r>
+              <a:rPr lang="es-MX" sz="3000" dirty="0" err="1"/>
+              <a:t>How</a:t>
+            </a:r>
             <a:r>
               <a:rPr lang="es-MX" sz="3000" dirty="0"/>
-              <a:t>¿A qué temperatura caliento el sartén?</a:t>
-            </a:r>
-          </a:p>
-          <a:p>
+              <a:t> </a:t>
+            </a:r>
+            <a:r>
+              <a:rPr lang="es-MX" sz="3000" dirty="0" err="1"/>
+              <a:t>much</a:t>
+            </a:r>
             <a:r>
               <a:rPr lang="es-MX" sz="3000" dirty="0"/>
-              <a:t>¿Dónde está el sartén?</a:t>
-            </a:r>
-          </a:p>
-          <a:p>
+              <a:t> </a:t>
+            </a:r>
+            <a:r>
+              <a:rPr lang="es-MX" sz="3000" dirty="0" err="1"/>
+              <a:t>milk</a:t>
+            </a:r>
             <a:r>
               <a:rPr lang="es-MX" sz="3000" dirty="0"/>
-              <a:t>¿Cómo vierto la mezcla? ¿Por cuánto tiempo?</a:t>
-            </a:r>
-          </a:p>
-          <a:p>
+              <a:t>?</a:t>
+            </a:r>
+          </a:p>
+          <a:p>
+            <a:r>
+              <a:rPr lang="es-MX" sz="3000" dirty="0" err="1"/>
+              <a:t>How</a:t>
+            </a:r>
             <a:r>
               <a:rPr lang="es-MX" sz="3000" dirty="0"/>
-              <a:t>¿De qué tamaño es el </a:t>
+              <a:t> </a:t>
+            </a:r>
+            <a:r>
+              <a:rPr lang="es-MX" sz="3000" dirty="0" err="1"/>
+              <a:t>long</a:t>
+            </a:r>
+            <a:r>
+              <a:rPr lang="es-MX" sz="3000" dirty="0"/>
+              <a:t> do </a:t>
+            </a:r>
+            <a:r>
+              <a:rPr lang="es-MX" sz="3000" dirty="0" err="1"/>
+              <a:t>you</a:t>
+            </a:r>
+            <a:r>
+              <a:rPr lang="es-MX" sz="3000" dirty="0"/>
+              <a:t> </a:t>
+            </a:r>
+            <a:r>
+              <a:rPr lang="es-MX" sz="3000" dirty="0" err="1"/>
+              <a:t>have</a:t>
+            </a:r>
+            <a:r>
+              <a:rPr lang="es-MX" sz="3000" dirty="0"/>
+              <a:t> </a:t>
+            </a:r>
+            <a:r>
+              <a:rPr lang="es-MX" sz="3000" dirty="0" err="1"/>
+              <a:t>to</a:t>
+            </a:r>
+            <a:r>
+              <a:rPr lang="es-MX" sz="3000" dirty="0"/>
+              <a:t> </a:t>
+            </a:r>
+            <a:r>
+              <a:rPr lang="es-MX" sz="3000" dirty="0" err="1"/>
+              <a:t>mix</a:t>
+            </a:r>
+            <a:r>
+              <a:rPr lang="es-MX" sz="3000" dirty="0"/>
+              <a:t> </a:t>
+            </a:r>
+            <a:r>
+              <a:rPr lang="es-MX" sz="3000" dirty="0" err="1"/>
+              <a:t>the</a:t>
+            </a:r>
+            <a:r>
+              <a:rPr lang="es-MX" sz="3000" dirty="0"/>
+              <a:t> </a:t>
+            </a:r>
+            <a:r>
+              <a:rPr lang="es-MX" sz="3000" dirty="0" err="1"/>
+              <a:t>ingredients</a:t>
+            </a:r>
+            <a:r>
+              <a:rPr lang="es-MX" sz="3000" dirty="0"/>
+              <a:t>? </a:t>
+            </a:r>
+            <a:r>
+              <a:rPr lang="es-MX" sz="3000" dirty="0" err="1"/>
+              <a:t>How</a:t>
+            </a:r>
+            <a:r>
+              <a:rPr lang="es-MX" sz="3000" dirty="0"/>
+              <a:t>? In </a:t>
+            </a:r>
+            <a:r>
+              <a:rPr lang="es-MX" sz="3000" dirty="0" err="1"/>
+              <a:t>what</a:t>
+            </a:r>
+            <a:r>
+              <a:rPr lang="es-MX" sz="3000" dirty="0"/>
+              <a:t> </a:t>
+            </a:r>
+            <a:r>
+              <a:rPr lang="es-MX" sz="3000" dirty="0" err="1"/>
+              <a:t>direction</a:t>
+            </a:r>
+            <a:r>
+              <a:rPr lang="es-MX" sz="3000" dirty="0"/>
+              <a:t>?</a:t>
+            </a:r>
+          </a:p>
+          <a:p>
+            <a:r>
+              <a:rPr lang="es-MX" sz="3000" dirty="0" err="1"/>
+              <a:t>How</a:t>
+            </a:r>
+            <a:r>
+              <a:rPr lang="es-MX" sz="3000" dirty="0"/>
+              <a:t> do </a:t>
+            </a:r>
+            <a:r>
+              <a:rPr lang="es-MX" sz="3000" dirty="0" err="1"/>
+              <a:t>you</a:t>
+            </a:r>
+            <a:r>
+              <a:rPr lang="es-MX" sz="3000" dirty="0"/>
+              <a:t> </a:t>
+            </a:r>
+            <a:r>
+              <a:rPr lang="es-MX" sz="3000" dirty="0" err="1"/>
+              <a:t>turn</a:t>
+            </a:r>
+            <a:r>
+              <a:rPr lang="es-MX" sz="3000" dirty="0"/>
+              <a:t> </a:t>
+            </a:r>
+            <a:r>
+              <a:rPr lang="es-MX" sz="3000" dirty="0" err="1"/>
+              <a:t>on</a:t>
+            </a:r>
+            <a:r>
+              <a:rPr lang="es-MX" sz="3000" dirty="0"/>
+              <a:t> </a:t>
+            </a:r>
+            <a:r>
+              <a:rPr lang="es-MX" sz="3000" dirty="0" err="1"/>
+              <a:t>the</a:t>
+            </a:r>
+            <a:r>
+              <a:rPr lang="es-MX" sz="3000" dirty="0"/>
+              <a:t> </a:t>
+            </a:r>
+            <a:r>
+              <a:rPr lang="es-MX" sz="3000" dirty="0" err="1"/>
+              <a:t>stove</a:t>
+            </a:r>
+            <a:r>
+              <a:rPr lang="es-MX" sz="3000" dirty="0"/>
+              <a:t>?</a:t>
+            </a:r>
+          </a:p>
+          <a:p>
+            <a:r>
+              <a:rPr lang="es-MX" sz="3000" dirty="0" err="1"/>
+              <a:t>What</a:t>
+            </a:r>
+            <a:r>
+              <a:rPr lang="es-MX" sz="3000" dirty="0"/>
+              <a:t> </a:t>
+            </a:r>
+            <a:r>
+              <a:rPr lang="es-MX" sz="3000" dirty="0" err="1"/>
+              <a:t>temperature</a:t>
+            </a:r>
+            <a:r>
+              <a:rPr lang="es-MX" sz="3000" dirty="0"/>
+              <a:t> do </a:t>
+            </a:r>
+            <a:r>
+              <a:rPr lang="es-MX" sz="3000" dirty="0" err="1"/>
+              <a:t>you</a:t>
+            </a:r>
+            <a:r>
+              <a:rPr lang="es-MX" sz="3000" dirty="0"/>
+              <a:t> </a:t>
+            </a:r>
+            <a:r>
+              <a:rPr lang="es-MX" sz="3000" dirty="0" err="1"/>
+              <a:t>need</a:t>
+            </a:r>
+            <a:r>
+              <a:rPr lang="es-MX" sz="3000" dirty="0"/>
+              <a:t> </a:t>
+            </a:r>
+            <a:r>
+              <a:rPr lang="es-MX" sz="3000" dirty="0" err="1"/>
+              <a:t>to</a:t>
+            </a:r>
+            <a:r>
+              <a:rPr lang="es-MX" sz="3000" dirty="0"/>
+              <a:t> </a:t>
+            </a:r>
+            <a:r>
+              <a:rPr lang="es-MX" sz="3000" dirty="0" err="1"/>
+              <a:t>pre-heat</a:t>
+            </a:r>
+            <a:r>
+              <a:rPr lang="es-MX" sz="3000" dirty="0"/>
+              <a:t> </a:t>
+            </a:r>
+            <a:r>
+              <a:rPr lang="es-MX" sz="3000" dirty="0" err="1"/>
+              <a:t>the</a:t>
+            </a:r>
+            <a:r>
+              <a:rPr lang="es-MX" sz="3000" dirty="0"/>
+              <a:t> pan?</a:t>
+            </a:r>
+          </a:p>
+          <a:p>
+            <a:r>
+              <a:rPr lang="es-MX" sz="3000" dirty="0" err="1"/>
+              <a:t>How</a:t>
+            </a:r>
+            <a:r>
+              <a:rPr lang="es-MX" sz="3000" dirty="0"/>
+              <a:t> do </a:t>
+            </a:r>
+            <a:r>
+              <a:rPr lang="es-MX" sz="3000" dirty="0" err="1"/>
+              <a:t>you</a:t>
+            </a:r>
+            <a:r>
+              <a:rPr lang="es-MX" sz="3000" dirty="0"/>
+              <a:t> </a:t>
+            </a:r>
+            <a:r>
+              <a:rPr lang="es-MX" sz="3000" dirty="0" err="1"/>
+              <a:t>pour</a:t>
+            </a:r>
+            <a:r>
+              <a:rPr lang="es-MX" sz="3000" dirty="0"/>
+              <a:t> </a:t>
+            </a:r>
+            <a:r>
+              <a:rPr lang="es-MX" sz="3000" dirty="0" err="1"/>
+              <a:t>the</a:t>
+            </a:r>
+            <a:r>
+              <a:rPr lang="es-MX" sz="3000" dirty="0"/>
+              <a:t> </a:t>
+            </a:r>
+            <a:r>
+              <a:rPr lang="es-MX" sz="3000" dirty="0" err="1"/>
+              <a:t>batter</a:t>
+            </a:r>
+            <a:r>
+              <a:rPr lang="es-MX" sz="3000" dirty="0"/>
+              <a:t> </a:t>
+            </a:r>
+            <a:r>
+              <a:rPr lang="es-MX" sz="3000" dirty="0" err="1"/>
+              <a:t>into</a:t>
+            </a:r>
+            <a:r>
+              <a:rPr lang="es-MX" sz="3000" dirty="0"/>
+              <a:t> </a:t>
+            </a:r>
+            <a:r>
+              <a:rPr lang="es-MX" sz="3000" dirty="0" err="1"/>
+              <a:t>the</a:t>
+            </a:r>
+            <a:r>
+              <a:rPr lang="es-MX" sz="3000" dirty="0"/>
+              <a:t> pan? </a:t>
+            </a:r>
+            <a:r>
+              <a:rPr lang="es-MX" sz="3000" dirty="0" err="1"/>
+              <a:t>For</a:t>
+            </a:r>
+            <a:r>
+              <a:rPr lang="es-MX" sz="3000" dirty="0"/>
+              <a:t> </a:t>
+            </a:r>
+            <a:r>
+              <a:rPr lang="es-MX" sz="3000" dirty="0" err="1"/>
+              <a:t>how</a:t>
+            </a:r>
+            <a:r>
+              <a:rPr lang="es-MX" sz="3000" dirty="0"/>
+              <a:t> </a:t>
+            </a:r>
+            <a:r>
+              <a:rPr lang="es-MX" sz="3000" dirty="0" err="1"/>
+              <a:t>long</a:t>
+            </a:r>
+            <a:r>
+              <a:rPr lang="es-MX" sz="3000" dirty="0"/>
+              <a:t>?</a:t>
+            </a:r>
+          </a:p>
+          <a:p>
+            <a:r>
+              <a:rPr lang="es-MX" sz="3000" dirty="0" err="1"/>
+              <a:t>What</a:t>
+            </a:r>
+            <a:r>
+              <a:rPr lang="es-MX" sz="3000" dirty="0"/>
+              <a:t> </a:t>
+            </a:r>
+            <a:r>
+              <a:rPr lang="es-MX" sz="3000" dirty="0" err="1"/>
+              <a:t>size</a:t>
+            </a:r>
+            <a:r>
+              <a:rPr lang="es-MX" sz="3000" dirty="0"/>
+              <a:t> </a:t>
+            </a:r>
+            <a:r>
+              <a:rPr lang="es-MX" sz="3000" dirty="0" err="1"/>
+              <a:t>of</a:t>
+            </a:r>
+            <a:r>
+              <a:rPr lang="es-MX" sz="3000" dirty="0"/>
+              <a:t> </a:t>
             </a:r>
             <a:r>
               <a:rPr lang="es-MX" sz="3000" dirty="0" err="1"/>
@@ -2965,13 +3462,39 @@
             </a:r>
             <a:r>
               <a:rPr lang="es-MX" sz="3000" dirty="0"/>
-              <a:t> cake?</a:t>
-            </a:r>
-          </a:p>
-          <a:p>
+              <a:t> cake do </a:t>
+            </a:r>
+            <a:r>
+              <a:rPr lang="es-MX" sz="3000" dirty="0" err="1"/>
+              <a:t>you</a:t>
+            </a:r>
             <a:r>
               <a:rPr lang="es-MX" sz="3000" dirty="0"/>
-              <a:t>¿En dónde lo sirvo?</a:t>
+              <a:t> </a:t>
+            </a:r>
+            <a:r>
+              <a:rPr lang="es-MX" sz="3000" dirty="0" err="1"/>
+              <a:t>want</a:t>
+            </a:r>
+            <a:r>
+              <a:rPr lang="es-MX" sz="3000" dirty="0"/>
+              <a:t> </a:t>
+            </a:r>
+            <a:r>
+              <a:rPr lang="es-MX" sz="3000" dirty="0" err="1"/>
+              <a:t>to</a:t>
+            </a:r>
+            <a:r>
+              <a:rPr lang="es-MX" sz="3000" dirty="0"/>
+              <a:t> </a:t>
+            </a:r>
+            <a:r>
+              <a:rPr lang="es-MX" sz="3000" dirty="0" err="1"/>
+              <a:t>make</a:t>
+            </a:r>
+            <a:r>
+              <a:rPr lang="es-MX" sz="3000" dirty="0"/>
+              <a:t>?</a:t>
             </a:r>
           </a:p>
         </p:txBody>
@@ -3115,26 +3638,39 @@
                                   </p:childTnLst>
                                 </p:cTn>
                               </p:par>
-                            </p:childTnLst>
-                          </p:cTn>
-                        </p:par>
-                      </p:childTnLst>
-                    </p:cTn>
-                  </p:par>
-                  <p:par>
-                    <p:cTn id="9" fill="hold">
-                      <p:stCondLst>
-                        <p:cond delay="indefinite"/>
-                      </p:stCondLst>
-                      <p:childTnLst>
-                        <p:par>
-                          <p:cTn id="10" fill="hold">
-                            <p:stCondLst>
-                              <p:cond delay="0"/>
-                            </p:stCondLst>
-                            <p:childTnLst>
                               <p:par>
-                                <p:cTn id="11" presetID="1" presetClass="entr" presetSubtype="0" fill="hold" nodeType="clickEffect">
+                                <p:cTn id="9" presetID="1" presetClass="entr" presetSubtype="0" fill="hold" nodeType="withEffect">
+                                  <p:stCondLst>
+                                    <p:cond delay="0"/>
+                                  </p:stCondLst>
+                                  <p:childTnLst>
+                                    <p:set>
+                                      <p:cBhvr>
+                                        <p:cTn id="10" dur="1" fill="hold">
+                                          <p:stCondLst>
+                                            <p:cond delay="0"/>
+                                          </p:stCondLst>
+                                        </p:cTn>
+                                        <p:tgtEl>
+                                          <p:spTgt spid="3">
+                                            <p:txEl>
+                                              <p:pRg st="2" end="2"/>
+                                            </p:txEl>
+                                          </p:spTgt>
+                                        </p:tgtEl>
+                                        <p:attrNameLst>
+                                          <p:attrName>style.visibility</p:attrName>
+                                        </p:attrNameLst>
+                                      </p:cBhvr>
+                                      <p:to>
+                                        <p:strVal val="visible"/>
+                                      </p:to>
+                                    </p:set>
+                                  </p:childTnLst>
+                                </p:cTn>
+                              </p:par>
+                              <p:par>
+                                <p:cTn id="11" presetID="1" presetClass="entr" presetSubtype="0" fill="hold" nodeType="withEffect">
                                   <p:stCondLst>
                                     <p:cond delay="0"/>
                                   </p:stCondLst>
@@ -3149,7 +3685,7 @@
                                         <p:tgtEl>
                                           <p:spTgt spid="3">
                                             <p:txEl>
-                                              <p:pRg st="2" end="2"/>
+                                              <p:pRg st="3" end="3"/>
                                             </p:txEl>
                                           </p:spTgt>
                                         </p:tgtEl>
@@ -3180,7 +3716,7 @@
                                         <p:tgtEl>
                                           <p:spTgt spid="3">
                                             <p:txEl>
-                                              <p:pRg st="3" end="3"/>
+                                              <p:pRg st="4" end="4"/>
                                             </p:txEl>
                                           </p:spTgt>
                                         </p:tgtEl>
@@ -3195,26 +3731,39 @@
                                   </p:childTnLst>
                                 </p:cTn>
                               </p:par>
-                            </p:childTnLst>
-                          </p:cTn>
-                        </p:par>
-                      </p:childTnLst>
-                    </p:cTn>
-                  </p:par>
-                  <p:par>
-                    <p:cTn id="15" fill="hold">
-                      <p:stCondLst>
-                        <p:cond delay="indefinite"/>
-                      </p:stCondLst>
-                      <p:childTnLst>
-                        <p:par>
-                          <p:cTn id="16" fill="hold">
-                            <p:stCondLst>
-                              <p:cond delay="0"/>
-                            </p:stCondLst>
-                            <p:childTnLst>
                               <p:par>
-                                <p:cTn id="17" presetID="1" presetClass="entr" presetSubtype="0" fill="hold" nodeType="clickEffect">
+                                <p:cTn id="15" presetID="1" presetClass="entr" presetSubtype="0" fill="hold" nodeType="withEffect">
+                                  <p:stCondLst>
+                                    <p:cond delay="0"/>
+                                  </p:stCondLst>
+                                  <p:childTnLst>
+                                    <p:set>
+                                      <p:cBhvr>
+                                        <p:cTn id="16" dur="1" fill="hold">
+                                          <p:stCondLst>
+                                            <p:cond delay="0"/>
+                                          </p:stCondLst>
+                                        </p:cTn>
+                                        <p:tgtEl>
+                                          <p:spTgt spid="3">
+                                            <p:txEl>
+                                              <p:pRg st="5" end="5"/>
+                                            </p:txEl>
+                                          </p:spTgt>
+                                        </p:tgtEl>
+                                        <p:attrNameLst>
+                                          <p:attrName>style.visibility</p:attrName>
+                                        </p:attrNameLst>
+                                      </p:cBhvr>
+                                      <p:to>
+                                        <p:strVal val="visible"/>
+                                      </p:to>
+                                    </p:set>
+                                  </p:childTnLst>
+                                </p:cTn>
+                              </p:par>
+                              <p:par>
+                                <p:cTn id="17" presetID="1" presetClass="entr" presetSubtype="0" fill="hold" nodeType="withEffect">
                                   <p:stCondLst>
                                     <p:cond delay="0"/>
                                   </p:stCondLst>
@@ -3229,7 +3778,7 @@
                                         <p:tgtEl>
                                           <p:spTgt spid="3">
                                             <p:txEl>
-                                              <p:pRg st="4" end="4"/>
+                                              <p:pRg st="6" end="6"/>
                                             </p:txEl>
                                           </p:spTgt>
                                         </p:tgtEl>
@@ -3260,216 +3809,7 @@
                                         <p:tgtEl>
                                           <p:spTgt spid="3">
                                             <p:txEl>
-                                              <p:pRg st="5" end="5"/>
-                                            </p:txEl>
-                                          </p:spTgt>
-                                        </p:tgtEl>
-                                        <p:attrNameLst>
-                                          <p:attrName>style.visibility</p:attrName>
-                                        </p:attrNameLst>
-                                      </p:cBhvr>
-                                      <p:to>
-                                        <p:strVal val="visible"/>
-                                      </p:to>
-                                    </p:set>
-                                  </p:childTnLst>
-                                </p:cTn>
-                              </p:par>
-                            </p:childTnLst>
-                          </p:cTn>
-                        </p:par>
-                      </p:childTnLst>
-                    </p:cTn>
-                  </p:par>
-                  <p:par>
-                    <p:cTn id="21" fill="hold">
-                      <p:stCondLst>
-                        <p:cond delay="indefinite"/>
-                      </p:stCondLst>
-                      <p:childTnLst>
-                        <p:par>
-                          <p:cTn id="22" fill="hold">
-                            <p:stCondLst>
-                              <p:cond delay="0"/>
-                            </p:stCondLst>
-                            <p:childTnLst>
-                              <p:par>
-                                <p:cTn id="23" presetID="1" presetClass="entr" presetSubtype="0" fill="hold" nodeType="clickEffect">
-                                  <p:stCondLst>
-                                    <p:cond delay="0"/>
-                                  </p:stCondLst>
-                                  <p:childTnLst>
-                                    <p:set>
-                                      <p:cBhvr>
-                                        <p:cTn id="24" dur="1" fill="hold">
-                                          <p:stCondLst>
-                                            <p:cond delay="0"/>
-                                          </p:stCondLst>
-                                        </p:cTn>
-                                        <p:tgtEl>
-                                          <p:spTgt spid="3">
-                                            <p:txEl>
-                                              <p:pRg st="6" end="6"/>
-                                            </p:txEl>
-                                          </p:spTgt>
-                                        </p:tgtEl>
-                                        <p:attrNameLst>
-                                          <p:attrName>style.visibility</p:attrName>
-                                        </p:attrNameLst>
-                                      </p:cBhvr>
-                                      <p:to>
-                                        <p:strVal val="visible"/>
-                                      </p:to>
-                                    </p:set>
-                                  </p:childTnLst>
-                                </p:cTn>
-                              </p:par>
-                              <p:par>
-                                <p:cTn id="25" presetID="1" presetClass="entr" presetSubtype="0" fill="hold" nodeType="withEffect">
-                                  <p:stCondLst>
-                                    <p:cond delay="0"/>
-                                  </p:stCondLst>
-                                  <p:childTnLst>
-                                    <p:set>
-                                      <p:cBhvr>
-                                        <p:cTn id="26" dur="1" fill="hold">
-                                          <p:stCondLst>
-                                            <p:cond delay="0"/>
-                                          </p:stCondLst>
-                                        </p:cTn>
-                                        <p:tgtEl>
-                                          <p:spTgt spid="3">
-                                            <p:txEl>
                                               <p:pRg st="7" end="7"/>
-                                            </p:txEl>
-                                          </p:spTgt>
-                                        </p:tgtEl>
-                                        <p:attrNameLst>
-                                          <p:attrName>style.visibility</p:attrName>
-                                        </p:attrNameLst>
-                                      </p:cBhvr>
-                                      <p:to>
-                                        <p:strVal val="visible"/>
-                                      </p:to>
-                                    </p:set>
-                                  </p:childTnLst>
-                                </p:cTn>
-                              </p:par>
-                            </p:childTnLst>
-                          </p:cTn>
-                        </p:par>
-                      </p:childTnLst>
-                    </p:cTn>
-                  </p:par>
-                  <p:par>
-                    <p:cTn id="27" fill="hold">
-                      <p:stCondLst>
-                        <p:cond delay="indefinite"/>
-                      </p:stCondLst>
-                      <p:childTnLst>
-                        <p:par>
-                          <p:cTn id="28" fill="hold">
-                            <p:stCondLst>
-                              <p:cond delay="0"/>
-                            </p:stCondLst>
-                            <p:childTnLst>
-                              <p:par>
-                                <p:cTn id="29" presetID="1" presetClass="entr" presetSubtype="0" fill="hold" nodeType="clickEffect">
-                                  <p:stCondLst>
-                                    <p:cond delay="0"/>
-                                  </p:stCondLst>
-                                  <p:childTnLst>
-                                    <p:set>
-                                      <p:cBhvr>
-                                        <p:cTn id="30" dur="1" fill="hold">
-                                          <p:stCondLst>
-                                            <p:cond delay="0"/>
-                                          </p:stCondLst>
-                                        </p:cTn>
-                                        <p:tgtEl>
-                                          <p:spTgt spid="3">
-                                            <p:txEl>
-                                              <p:pRg st="8" end="8"/>
-                                            </p:txEl>
-                                          </p:spTgt>
-                                        </p:tgtEl>
-                                        <p:attrNameLst>
-                                          <p:attrName>style.visibility</p:attrName>
-                                        </p:attrNameLst>
-                                      </p:cBhvr>
-                                      <p:to>
-                                        <p:strVal val="visible"/>
-                                      </p:to>
-                                    </p:set>
-                                  </p:childTnLst>
-                                </p:cTn>
-                              </p:par>
-                              <p:par>
-                                <p:cTn id="31" presetID="1" presetClass="entr" presetSubtype="0" fill="hold" nodeType="withEffect">
-                                  <p:stCondLst>
-                                    <p:cond delay="0"/>
-                                  </p:stCondLst>
-                                  <p:childTnLst>
-                                    <p:set>
-                                      <p:cBhvr>
-                                        <p:cTn id="32" dur="1" fill="hold">
-                                          <p:stCondLst>
-                                            <p:cond delay="0"/>
-                                          </p:stCondLst>
-                                        </p:cTn>
-                                        <p:tgtEl>
-                                          <p:spTgt spid="3">
-                                            <p:txEl>
-                                              <p:pRg st="9" end="9"/>
-                                            </p:txEl>
-                                          </p:spTgt>
-                                        </p:tgtEl>
-                                        <p:attrNameLst>
-                                          <p:attrName>style.visibility</p:attrName>
-                                        </p:attrNameLst>
-                                      </p:cBhvr>
-                                      <p:to>
-                                        <p:strVal val="visible"/>
-                                      </p:to>
-                                    </p:set>
-                                  </p:childTnLst>
-                                </p:cTn>
-                              </p:par>
-                            </p:childTnLst>
-                          </p:cTn>
-                        </p:par>
-                      </p:childTnLst>
-                    </p:cTn>
-                  </p:par>
-                  <p:par>
-                    <p:cTn id="33" fill="hold">
-                      <p:stCondLst>
-                        <p:cond delay="indefinite"/>
-                      </p:stCondLst>
-                      <p:childTnLst>
-                        <p:par>
-                          <p:cTn id="34" fill="hold">
-                            <p:stCondLst>
-                              <p:cond delay="0"/>
-                            </p:stCondLst>
-                            <p:childTnLst>
-                              <p:par>
-                                <p:cTn id="35" presetID="1" presetClass="entr" presetSubtype="0" fill="hold" nodeType="clickEffect">
-                                  <p:stCondLst>
-                                    <p:cond delay="0"/>
-                                  </p:stCondLst>
-                                  <p:childTnLst>
-                                    <p:set>
-                                      <p:cBhvr>
-                                        <p:cTn id="36" dur="1" fill="hold">
-                                          <p:stCondLst>
-                                            <p:cond delay="0"/>
-                                          </p:stCondLst>
-                                        </p:cTn>
-                                        <p:tgtEl>
-                                          <p:spTgt spid="3">
-                                            <p:txEl>
-                                              <p:pRg st="10" end="10"/>
                                             </p:txEl>
                                           </p:spTgt>
                                         </p:tgtEl>
@@ -3559,8 +3899,44 @@
           <a:lstStyle/>
           <a:p>
             <a:r>
+              <a:rPr lang="es-MX" sz="6600" dirty="0" err="1"/>
+              <a:t>How</a:t>
+            </a:r>
+            <a:r>
               <a:rPr lang="es-MX" sz="6600" dirty="0"/>
-              <a:t>¿Cómo podemos representar un algoritmo computacional?</a:t>
+              <a:t> can </a:t>
+            </a:r>
+            <a:r>
+              <a:rPr lang="es-MX" sz="6600" dirty="0" err="1"/>
+              <a:t>we</a:t>
+            </a:r>
+            <a:r>
+              <a:rPr lang="es-MX" sz="6600" dirty="0"/>
+              <a:t> </a:t>
+            </a:r>
+            <a:r>
+              <a:rPr lang="es-MX" sz="6600" dirty="0" err="1"/>
+              <a:t>represent</a:t>
+            </a:r>
+            <a:r>
+              <a:rPr lang="es-MX" sz="6600" dirty="0"/>
+              <a:t> </a:t>
+            </a:r>
+            <a:r>
+              <a:rPr lang="es-MX" sz="6600" dirty="0" err="1"/>
+              <a:t>an</a:t>
+            </a:r>
+            <a:r>
+              <a:rPr lang="es-MX" sz="6600" dirty="0"/>
+              <a:t> </a:t>
+            </a:r>
+            <a:r>
+              <a:rPr lang="es-MX" sz="6600" dirty="0" err="1"/>
+              <a:t>algorithm</a:t>
+            </a:r>
+            <a:r>
+              <a:rPr lang="es-MX" sz="6600" dirty="0"/>
+              <a:t>?</a:t>
             </a:r>
             <a:endParaRPr lang="en-US" sz="6600" dirty="0"/>
           </a:p>
@@ -3639,7 +4015,7 @@
                   <a:schemeClr val="bg1"/>
                 </a:solidFill>
               </a:rPr>
-              <a:t>Diagrama de flujo</a:t>
+              <a:t>Flow chart</a:t>
             </a:r>
             <a:endParaRPr lang="en-US" sz="4400" dirty="0">
               <a:solidFill>
@@ -3717,12 +4093,12 @@
           </a:lstStyle>
           <a:p>
             <a:r>
-              <a:rPr lang="es-MX" sz="4400" dirty="0">
+              <a:rPr lang="es-MX" sz="4400" dirty="0" err="1">
                 <a:solidFill>
                   <a:schemeClr val="bg1"/>
                 </a:solidFill>
               </a:rPr>
-              <a:t>Pseudocódigo</a:t>
+              <a:t>Pseudocode</a:t>
             </a:r>
             <a:endParaRPr lang="en-US" sz="4400" dirty="0">
               <a:solidFill>
@@ -4001,7 +4377,7 @@
           <a:p>
             <a:r>
               <a:rPr lang="es-MX" dirty="0"/>
-              <a:t>Diagramas de Flujo</a:t>
+              <a:t>Flow chart</a:t>
             </a:r>
             <a:endParaRPr lang="en-US" dirty="0"/>
           </a:p>
@@ -19327,7 +19703,7 @@
           <a:p>
             <a:r>
               <a:rPr lang="en-US" dirty="0"/>
-              <a:t>Can the Creator V1 Burger Maker know how to cook?</a:t>
+              <a:t>Does the Creator V1 Burger Maker know how to cook?</a:t>
             </a:r>
           </a:p>
         </p:txBody>
@@ -19504,12 +19880,8 @@
           </a:lstStyle>
           <a:p>
             <a:r>
-              <a:rPr lang="es-MX" dirty="0"/>
-              <a:t>Algoritmo para preparar </a:t>
-            </a:r>
-            <a:r>
               <a:rPr lang="es-MX" dirty="0" err="1"/>
-              <a:t>hot</a:t>
+              <a:t>Algorithm</a:t>
             </a:r>
             <a:r>
               <a:rPr lang="es-MX" dirty="0"/>
@@ -19517,7 +19889,15 @@
             </a:r>
             <a:r>
               <a:rPr lang="es-MX" dirty="0" err="1"/>
-              <a:t>cakes</a:t>
+              <a:t>for</a:t>
+            </a:r>
+            <a:r>
+              <a:rPr lang="es-MX" dirty="0"/>
+              <a:t> Hot </a:t>
+            </a:r>
+            <a:r>
+              <a:rPr lang="es-MX" dirty="0" err="1"/>
+              <a:t>Cakes</a:t>
             </a:r>
             <a:endParaRPr lang="en-US" dirty="0"/>
           </a:p>
@@ -19720,8 +20100,36 @@
               <a:buAutoNum type="arabicPeriod"/>
             </a:pPr>
             <a:r>
+              <a:rPr lang="es-MX" sz="3000" b="1" dirty="0" err="1"/>
+              <a:t>Mix</a:t>
+            </a:r>
+            <a:r>
               <a:rPr lang="es-MX" sz="3000" b="1" dirty="0"/>
-              <a:t>Mezclar harina, huevos, leche en un recipiente.</a:t>
+              <a:t> </a:t>
+            </a:r>
+            <a:r>
+              <a:rPr lang="es-MX" sz="3000" b="1" dirty="0" err="1"/>
+              <a:t>flour</a:t>
+            </a:r>
+            <a:r>
+              <a:rPr lang="es-MX" sz="3000" b="1" dirty="0"/>
+              <a:t>, </a:t>
+            </a:r>
+            <a:r>
+              <a:rPr lang="es-MX" sz="3000" b="1" dirty="0" err="1"/>
+              <a:t>eggs</a:t>
+            </a:r>
+            <a:r>
+              <a:rPr lang="es-MX" sz="3000" b="1" dirty="0"/>
+              <a:t> and </a:t>
+            </a:r>
+            <a:r>
+              <a:rPr lang="es-MX" sz="3000" b="1" dirty="0" err="1"/>
+              <a:t>milk</a:t>
+            </a:r>
+            <a:r>
+              <a:rPr lang="es-MX" sz="3000" b="1" dirty="0"/>
+              <a:t> in a container</a:t>
             </a:r>
           </a:p>
           <a:p>
@@ -19730,8 +20138,12 @@
               <a:buAutoNum type="arabicPeriod"/>
             </a:pPr>
             <a:r>
+              <a:rPr lang="es-MX" sz="3000" b="1" dirty="0" err="1"/>
+              <a:t>Mix</a:t>
+            </a:r>
+            <a:r>
               <a:rPr lang="es-MX" sz="3000" b="1" dirty="0"/>
-              <a:t>Batir hasta generar una mezcla uniforme</a:t>
+              <a:t> </a:t>
             </a:r>
           </a:p>
           <a:p>
@@ -19740,8 +20152,12 @@
               <a:buAutoNum type="arabicPeriod"/>
             </a:pPr>
             <a:r>
+              <a:rPr lang="es-MX" sz="3000" b="1" dirty="0" err="1"/>
+              <a:t>Pre-heat</a:t>
+            </a:r>
+            <a:r>
               <a:rPr lang="es-MX" sz="3000" b="1" dirty="0"/>
-              <a:t>Calentar sartén</a:t>
+              <a:t> pan</a:t>
             </a:r>
           </a:p>
           <a:p>
@@ -19750,8 +20166,44 @@
               <a:buAutoNum type="arabicPeriod"/>
             </a:pPr>
             <a:r>
+              <a:rPr lang="es-MX" sz="3000" b="1" dirty="0" err="1"/>
+              <a:t>Pour</a:t>
+            </a:r>
+            <a:r>
               <a:rPr lang="es-MX" sz="3000" b="1" dirty="0"/>
-              <a:t>Verter mezcla en sartén</a:t>
+              <a:t> </a:t>
+            </a:r>
+            <a:r>
+              <a:rPr lang="es-MX" sz="3000" b="1" dirty="0" err="1"/>
+              <a:t>the</a:t>
+            </a:r>
+            <a:r>
+              <a:rPr lang="es-MX" sz="3000" b="1" dirty="0"/>
+              <a:t> </a:t>
+            </a:r>
+            <a:r>
+              <a:rPr lang="es-MX" sz="3000" b="1" dirty="0" err="1"/>
+              <a:t>mix</a:t>
+            </a:r>
+            <a:r>
+              <a:rPr lang="es-MX" sz="3000" b="1" dirty="0"/>
+              <a:t> </a:t>
+            </a:r>
+            <a:r>
+              <a:rPr lang="es-MX" sz="3000" b="1" dirty="0" err="1"/>
+              <a:t>into</a:t>
+            </a:r>
+            <a:r>
+              <a:rPr lang="es-MX" sz="3000" b="1" dirty="0"/>
+              <a:t> </a:t>
+            </a:r>
+            <a:r>
+              <a:rPr lang="es-MX" sz="3000" b="1" dirty="0" err="1"/>
+              <a:t>the</a:t>
+            </a:r>
+            <a:r>
+              <a:rPr lang="es-MX" sz="3000" b="1" dirty="0"/>
+              <a:t> pan</a:t>
             </a:r>
           </a:p>
           <a:p>
@@ -19760,12 +20212,8 @@
               <a:buAutoNum type="arabicPeriod"/>
             </a:pPr>
             <a:r>
-              <a:rPr lang="en-US" sz="3000" b="1" dirty="0" err="1"/>
-              <a:t>Voltear</a:t>
-            </a:r>
-            <a:r>
               <a:rPr lang="en-US" sz="3000" b="1" dirty="0"/>
-              <a:t> el hot cake</a:t>
+              <a:t>Flip the hot cake</a:t>
             </a:r>
           </a:p>
           <a:p>
@@ -19774,10 +20222,9 @@
               <a:buAutoNum type="arabicPeriod"/>
             </a:pPr>
             <a:r>
-              <a:rPr lang="en-US" sz="3000" b="1" dirty="0" err="1"/>
-              <a:t>Servir</a:t>
-            </a:r>
-            <a:endParaRPr lang="en-US" sz="3000" b="1" dirty="0"/>
+              <a:rPr lang="en-US" sz="3000" b="1" dirty="0"/>
+              <a:t>Enjoy!</a:t>
+            </a:r>
           </a:p>
         </p:txBody>
       </p:sp>
@@ -20162,10 +20609,9 @@
           <a:lstStyle/>
           <a:p>
             <a:r>
-              <a:rPr lang="es-MX" sz="5400" i="1" dirty="0"/>
-              <a:t>Al seguir un algoritmo al pie de la letra, el ejecutor no necesita conocer el por qué algo funciona.</a:t>
-            </a:r>
-            <a:endParaRPr lang="en-US" sz="5400" i="1" dirty="0"/>
+              <a:rPr lang="en-US" sz="5400" i="1" dirty="0"/>
+              <a:t>By following an algorithm step-by-step, the executor does not have to understand what is going on</a:t>
+            </a:r>
           </a:p>
         </p:txBody>
       </p:sp>

</xml_diff>